<commit_message>
Added Updated Slide Deck for Final Presentation
</commit_message>
<xml_diff>
--- a/Final_Project/A.Kramer-Final.Project.Slide.Deck.pptx
+++ b/Final_Project/A.Kramer-Final.Project.Slide.Deck.pptx
@@ -8,6 +8,8 @@
     <p:sldId id="256" r:id="rId2"/>
     <p:sldId id="257" r:id="rId3"/>
     <p:sldId id="258" r:id="rId4"/>
+    <p:sldId id="260" r:id="rId5"/>
+    <p:sldId id="259" r:id="rId6"/>
   </p:sldIdLst>
   <p:sldSz cx="12192000" cy="6858000"/>
   <p:notesSz cx="6858000" cy="9144000"/>
@@ -106,6 +108,11 @@
       </a:defRPr>
     </a:lvl9pPr>
   </p:defaultTextStyle>
+  <p:extLst>
+    <p:ext uri="{EFAFB233-063F-42B5-8137-9DF3F51BA10A}">
+      <p15:sldGuideLst xmlns:p15="http://schemas.microsoft.com/office/powerpoint/2012/main"/>
+    </p:ext>
+  </p:extLst>
 </p:presentation>
 </file>
 
@@ -240,7 +247,7 @@
           <a:p>
             <a:fld id="{923BD7BB-EA44-4979-9B9E-8581EAB2C605}" type="datetimeFigureOut">
               <a:rPr lang="en-US" smtClean="0"/>
-              <a:t>12/1/2015</a:t>
+              <a:t>12/2/2015</a:t>
             </a:fld>
             <a:endParaRPr lang="en-US"/>
           </a:p>
@@ -410,7 +417,7 @@
           <a:p>
             <a:fld id="{923BD7BB-EA44-4979-9B9E-8581EAB2C605}" type="datetimeFigureOut">
               <a:rPr lang="en-US" smtClean="0"/>
-              <a:t>12/1/2015</a:t>
+              <a:t>12/2/2015</a:t>
             </a:fld>
             <a:endParaRPr lang="en-US"/>
           </a:p>
@@ -590,7 +597,7 @@
           <a:p>
             <a:fld id="{923BD7BB-EA44-4979-9B9E-8581EAB2C605}" type="datetimeFigureOut">
               <a:rPr lang="en-US" smtClean="0"/>
-              <a:t>12/1/2015</a:t>
+              <a:t>12/2/2015</a:t>
             </a:fld>
             <a:endParaRPr lang="en-US"/>
           </a:p>
@@ -760,7 +767,7 @@
           <a:p>
             <a:fld id="{923BD7BB-EA44-4979-9B9E-8581EAB2C605}" type="datetimeFigureOut">
               <a:rPr lang="en-US" smtClean="0"/>
-              <a:t>12/1/2015</a:t>
+              <a:t>12/2/2015</a:t>
             </a:fld>
             <a:endParaRPr lang="en-US"/>
           </a:p>
@@ -1006,7 +1013,7 @@
           <a:p>
             <a:fld id="{923BD7BB-EA44-4979-9B9E-8581EAB2C605}" type="datetimeFigureOut">
               <a:rPr lang="en-US" smtClean="0"/>
-              <a:t>12/1/2015</a:t>
+              <a:t>12/2/2015</a:t>
             </a:fld>
             <a:endParaRPr lang="en-US"/>
           </a:p>
@@ -1238,7 +1245,7 @@
           <a:p>
             <a:fld id="{923BD7BB-EA44-4979-9B9E-8581EAB2C605}" type="datetimeFigureOut">
               <a:rPr lang="en-US" smtClean="0"/>
-              <a:t>12/1/2015</a:t>
+              <a:t>12/2/2015</a:t>
             </a:fld>
             <a:endParaRPr lang="en-US"/>
           </a:p>
@@ -1605,7 +1612,7 @@
           <a:p>
             <a:fld id="{923BD7BB-EA44-4979-9B9E-8581EAB2C605}" type="datetimeFigureOut">
               <a:rPr lang="en-US" smtClean="0"/>
-              <a:t>12/1/2015</a:t>
+              <a:t>12/2/2015</a:t>
             </a:fld>
             <a:endParaRPr lang="en-US"/>
           </a:p>
@@ -1723,7 +1730,7 @@
           <a:p>
             <a:fld id="{923BD7BB-EA44-4979-9B9E-8581EAB2C605}" type="datetimeFigureOut">
               <a:rPr lang="en-US" smtClean="0"/>
-              <a:t>12/1/2015</a:t>
+              <a:t>12/2/2015</a:t>
             </a:fld>
             <a:endParaRPr lang="en-US"/>
           </a:p>
@@ -1818,7 +1825,7 @@
           <a:p>
             <a:fld id="{923BD7BB-EA44-4979-9B9E-8581EAB2C605}" type="datetimeFigureOut">
               <a:rPr lang="en-US" smtClean="0"/>
-              <a:t>12/1/2015</a:t>
+              <a:t>12/2/2015</a:t>
             </a:fld>
             <a:endParaRPr lang="en-US"/>
           </a:p>
@@ -2095,7 +2102,7 @@
           <a:p>
             <a:fld id="{923BD7BB-EA44-4979-9B9E-8581EAB2C605}" type="datetimeFigureOut">
               <a:rPr lang="en-US" smtClean="0"/>
-              <a:t>12/1/2015</a:t>
+              <a:t>12/2/2015</a:t>
             </a:fld>
             <a:endParaRPr lang="en-US"/>
           </a:p>
@@ -2348,7 +2355,7 @@
           <a:p>
             <a:fld id="{923BD7BB-EA44-4979-9B9E-8581EAB2C605}" type="datetimeFigureOut">
               <a:rPr lang="en-US" smtClean="0"/>
-              <a:t>12/1/2015</a:t>
+              <a:t>12/2/2015</a:t>
             </a:fld>
             <a:endParaRPr lang="en-US"/>
           </a:p>
@@ -2561,7 +2568,7 @@
           <a:p>
             <a:fld id="{923BD7BB-EA44-4979-9B9E-8581EAB2C605}" type="datetimeFigureOut">
               <a:rPr lang="en-US" smtClean="0"/>
-              <a:t>12/1/2015</a:t>
+              <a:t>12/2/2015</a:t>
             </a:fld>
             <a:endParaRPr lang="en-US"/>
           </a:p>
@@ -3034,6 +3041,13 @@
   <p:clrMapOvr>
     <a:masterClrMapping/>
   </p:clrMapOvr>
+  <p:timing>
+    <p:tnLst>
+      <p:par>
+        <p:cTn id="1" dur="indefinite" restart="never" nodeType="tmRoot"/>
+      </p:par>
+    </p:tnLst>
+  </p:timing>
 </p:sld>
 </file>
 
@@ -3069,6 +3083,10 @@
           <a:bodyPr/>
           <a:lstStyle/>
           <a:p>
+            <a:r>
+              <a:rPr lang="en-US" dirty="0" smtClean="0"/>
+              <a:t>Viz. Screenshot and URL</a:t>
+            </a:r>
             <a:endParaRPr lang="en-US" dirty="0"/>
           </a:p>
         </p:txBody>
@@ -3088,7 +3106,11 @@
           <a:bodyPr/>
           <a:lstStyle/>
           <a:p>
-            <a:endParaRPr lang="en-US"/>
+            <a:r>
+              <a:rPr lang="en-US" dirty="0" smtClean="0"/>
+              <a:t>TBD</a:t>
+            </a:r>
+            <a:endParaRPr lang="en-US" dirty="0"/>
           </a:p>
         </p:txBody>
       </p:sp>
@@ -3215,6 +3237,274 @@
   <p:clrMapOvr>
     <a:masterClrMapping/>
   </p:clrMapOvr>
+</p:sld>
+</file>
+
+<file path=ppt/slides/slide4.xml><?xml version="1.0" encoding="utf-8"?>
+<p:sld xmlns:a="http://schemas.openxmlformats.org/drawingml/2006/main" xmlns:r="http://schemas.openxmlformats.org/officeDocument/2006/relationships" xmlns:p="http://schemas.openxmlformats.org/presentationml/2006/main">
+  <p:cSld>
+    <p:spTree>
+      <p:nvGrpSpPr>
+        <p:cNvPr id="1" name=""/>
+        <p:cNvGrpSpPr/>
+        <p:nvPr/>
+      </p:nvGrpSpPr>
+      <p:grpSpPr>
+        <a:xfrm>
+          <a:off x="0" y="0"/>
+          <a:ext cx="0" cy="0"/>
+          <a:chOff x="0" y="0"/>
+          <a:chExt cx="0" cy="0"/>
+        </a:xfrm>
+      </p:grpSpPr>
+      <p:sp>
+        <p:nvSpPr>
+          <p:cNvPr id="2" name="Title 1"/>
+          <p:cNvSpPr>
+            <a:spLocks noGrp="1"/>
+          </p:cNvSpPr>
+          <p:nvPr>
+            <p:ph type="title"/>
+          </p:nvPr>
+        </p:nvSpPr>
+        <p:spPr/>
+        <p:txBody>
+          <a:bodyPr/>
+          <a:lstStyle/>
+          <a:p>
+            <a:r>
+              <a:rPr lang="en-US" dirty="0" smtClean="0"/>
+              <a:t>The story (Planned)</a:t>
+            </a:r>
+            <a:endParaRPr lang="en-US" dirty="0"/>
+          </a:p>
+        </p:txBody>
+      </p:sp>
+      <p:sp>
+        <p:nvSpPr>
+          <p:cNvPr id="3" name="Content Placeholder 2"/>
+          <p:cNvSpPr>
+            <a:spLocks noGrp="1"/>
+          </p:cNvSpPr>
+          <p:nvPr>
+            <p:ph idx="1"/>
+          </p:nvPr>
+        </p:nvSpPr>
+        <p:spPr/>
+        <p:txBody>
+          <a:bodyPr/>
+          <a:lstStyle/>
+          <a:p>
+            <a:r>
+              <a:rPr lang="en-US" dirty="0" smtClean="0"/>
+              <a:t>Show the number of permits issued over time</a:t>
+            </a:r>
+          </a:p>
+          <a:p>
+            <a:r>
+              <a:rPr lang="en-US" dirty="0" smtClean="0"/>
+              <a:t>Show the permits on the map</a:t>
+            </a:r>
+          </a:p>
+          <a:p>
+            <a:r>
+              <a:rPr lang="en-US" dirty="0" smtClean="0"/>
+              <a:t>Show revenue received from permits</a:t>
+            </a:r>
+          </a:p>
+          <a:p>
+            <a:r>
+              <a:rPr lang="en-US" dirty="0" smtClean="0"/>
+              <a:t>Show valuation of the projects</a:t>
+            </a:r>
+          </a:p>
+          <a:p>
+            <a:r>
+              <a:rPr lang="en-US" dirty="0" smtClean="0"/>
+              <a:t>Show sorted table of the projects per category</a:t>
+            </a:r>
+            <a:endParaRPr lang="en-US" dirty="0"/>
+          </a:p>
+        </p:txBody>
+      </p:sp>
+    </p:spTree>
+    <p:extLst>
+      <p:ext uri="{BB962C8B-B14F-4D97-AF65-F5344CB8AC3E}">
+        <p14:creationId xmlns:p14="http://schemas.microsoft.com/office/powerpoint/2010/main" val="2628492493"/>
+      </p:ext>
+    </p:extLst>
+  </p:cSld>
+  <p:clrMapOvr>
+    <a:masterClrMapping/>
+  </p:clrMapOvr>
+  <p:timing>
+    <p:tnLst>
+      <p:par>
+        <p:cTn id="1" dur="indefinite" restart="never" nodeType="tmRoot"/>
+      </p:par>
+    </p:tnLst>
+  </p:timing>
+</p:sld>
+</file>
+
+<file path=ppt/slides/slide5.xml><?xml version="1.0" encoding="utf-8"?>
+<p:sld xmlns:a="http://schemas.openxmlformats.org/drawingml/2006/main" xmlns:r="http://schemas.openxmlformats.org/officeDocument/2006/relationships" xmlns:p="http://schemas.openxmlformats.org/presentationml/2006/main">
+  <p:cSld>
+    <p:spTree>
+      <p:nvGrpSpPr>
+        <p:cNvPr id="1" name=""/>
+        <p:cNvGrpSpPr/>
+        <p:nvPr/>
+      </p:nvGrpSpPr>
+      <p:grpSpPr>
+        <a:xfrm>
+          <a:off x="0" y="0"/>
+          <a:ext cx="0" cy="0"/>
+          <a:chOff x="0" y="0"/>
+          <a:chExt cx="0" cy="0"/>
+        </a:xfrm>
+      </p:grpSpPr>
+      <p:sp>
+        <p:nvSpPr>
+          <p:cNvPr id="2" name="Title 1"/>
+          <p:cNvSpPr>
+            <a:spLocks noGrp="1"/>
+          </p:cNvSpPr>
+          <p:nvPr>
+            <p:ph type="title"/>
+          </p:nvPr>
+        </p:nvSpPr>
+        <p:spPr/>
+        <p:txBody>
+          <a:bodyPr/>
+          <a:lstStyle/>
+          <a:p>
+            <a:r>
+              <a:rPr lang="en-US" dirty="0" smtClean="0"/>
+              <a:t>Some of the Data Fields</a:t>
+            </a:r>
+            <a:endParaRPr lang="en-US" dirty="0"/>
+          </a:p>
+        </p:txBody>
+      </p:sp>
+      <p:sp>
+        <p:nvSpPr>
+          <p:cNvPr id="3" name="Content Placeholder 2"/>
+          <p:cNvSpPr>
+            <a:spLocks noGrp="1"/>
+          </p:cNvSpPr>
+          <p:nvPr>
+            <p:ph idx="1"/>
+          </p:nvPr>
+        </p:nvSpPr>
+        <p:spPr/>
+        <p:txBody>
+          <a:bodyPr>
+            <a:normAutofit fontScale="62500" lnSpcReduction="20000"/>
+          </a:bodyPr>
+          <a:lstStyle/>
+          <a:p>
+            <a:r>
+              <a:rPr lang="en-US" dirty="0" smtClean="0"/>
+              <a:t>Permit Number – Unique permit number</a:t>
+            </a:r>
+          </a:p>
+          <a:p>
+            <a:r>
+              <a:rPr lang="en-US" dirty="0" smtClean="0"/>
+              <a:t>Address – Full address</a:t>
+            </a:r>
+          </a:p>
+          <a:p>
+            <a:r>
+              <a:rPr lang="en-US" dirty="0" smtClean="0"/>
+              <a:t>Coordinates – longitude and latitude pair</a:t>
+            </a:r>
+          </a:p>
+          <a:p>
+            <a:r>
+              <a:rPr lang="en-US" dirty="0" smtClean="0"/>
+              <a:t>Longitude – longitude</a:t>
+            </a:r>
+          </a:p>
+          <a:p>
+            <a:r>
+              <a:rPr lang="en-US" dirty="0" smtClean="0"/>
+              <a:t>Latitude – latitude</a:t>
+            </a:r>
+          </a:p>
+          <a:p>
+            <a:r>
+              <a:rPr lang="en-US" dirty="0" smtClean="0"/>
+              <a:t>Permit Type – a type of permit, categorical</a:t>
+            </a:r>
+          </a:p>
+          <a:p>
+            <a:r>
+              <a:rPr lang="en-US" dirty="0" smtClean="0"/>
+              <a:t>Work Class – class of work, categorical</a:t>
+            </a:r>
+          </a:p>
+          <a:p>
+            <a:r>
+              <a:rPr lang="en-US" dirty="0" smtClean="0"/>
+              <a:t>Apply Date – date of the application</a:t>
+            </a:r>
+          </a:p>
+          <a:p>
+            <a:r>
+              <a:rPr lang="en-US" dirty="0" smtClean="0"/>
+              <a:t>Issue Data – date the permit was issued</a:t>
+            </a:r>
+          </a:p>
+          <a:p>
+            <a:r>
+              <a:rPr lang="en-US" dirty="0" smtClean="0"/>
+              <a:t>Permit Detail – URL</a:t>
+            </a:r>
+          </a:p>
+          <a:p>
+            <a:r>
+              <a:rPr lang="en-US" dirty="0" smtClean="0"/>
+              <a:t>Valuation – Cost of the project</a:t>
+            </a:r>
+          </a:p>
+          <a:p>
+            <a:r>
+              <a:rPr lang="en-US" dirty="0" err="1" smtClean="0"/>
+              <a:t>Sq</a:t>
+            </a:r>
+            <a:r>
+              <a:rPr lang="en-US" dirty="0" smtClean="0"/>
+              <a:t> FT – square footage affected by the project</a:t>
+            </a:r>
+          </a:p>
+          <a:p>
+            <a:r>
+              <a:rPr lang="en-US" dirty="0" smtClean="0"/>
+              <a:t>Total Fees – fees paid to the City of Redmond</a:t>
+            </a:r>
+            <a:endParaRPr lang="en-US" dirty="0"/>
+          </a:p>
+        </p:txBody>
+      </p:sp>
+    </p:spTree>
+    <p:extLst>
+      <p:ext uri="{BB962C8B-B14F-4D97-AF65-F5344CB8AC3E}">
+        <p14:creationId xmlns:p14="http://schemas.microsoft.com/office/powerpoint/2010/main" val="3354076467"/>
+      </p:ext>
+    </p:extLst>
+  </p:cSld>
+  <p:clrMapOvr>
+    <a:masterClrMapping/>
+  </p:clrMapOvr>
+  <p:timing>
+    <p:tnLst>
+      <p:par>
+        <p:cTn id="1" dur="indefinite" restart="never" nodeType="tmRoot"/>
+      </p:par>
+    </p:tnLst>
+  </p:timing>
 </p:sld>
 </file>
 

</xml_diff>

<commit_message>
Added final project - 98% complete
</commit_message>
<xml_diff>
--- a/Final_Project/A.Kramer-Final.Project.Slide.Deck.pptx
+++ b/Final_Project/A.Kramer-Final.Project.Slide.Deck.pptx
@@ -7,9 +7,10 @@
   <p:sldIdLst>
     <p:sldId id="256" r:id="rId2"/>
     <p:sldId id="257" r:id="rId3"/>
-    <p:sldId id="258" r:id="rId4"/>
-    <p:sldId id="260" r:id="rId5"/>
-    <p:sldId id="259" r:id="rId6"/>
+    <p:sldId id="261" r:id="rId4"/>
+    <p:sldId id="258" r:id="rId5"/>
+    <p:sldId id="260" r:id="rId6"/>
+    <p:sldId id="259" r:id="rId7"/>
   </p:sldIdLst>
   <p:sldSz cx="12192000" cy="6858000"/>
   <p:notesSz cx="6858000" cy="9144000"/>
@@ -110,7 +111,7 @@
   </p:defaultTextStyle>
   <p:extLst>
     <p:ext uri="{EFAFB233-063F-42B5-8137-9DF3F51BA10A}">
-      <p15:sldGuideLst xmlns:p15="http://schemas.microsoft.com/office/powerpoint/2012/main"/>
+      <p15:sldGuideLst xmlns="" xmlns:p15="http://schemas.microsoft.com/office/powerpoint/2012/main"/>
     </p:ext>
   </p:extLst>
 </p:presentation>
@@ -247,7 +248,7 @@
           <a:p>
             <a:fld id="{923BD7BB-EA44-4979-9B9E-8581EAB2C605}" type="datetimeFigureOut">
               <a:rPr lang="en-US" smtClean="0"/>
-              <a:t>12/2/2015</a:t>
+              <a:t>12/5/2015</a:t>
             </a:fld>
             <a:endParaRPr lang="en-US"/>
           </a:p>
@@ -417,7 +418,7 @@
           <a:p>
             <a:fld id="{923BD7BB-EA44-4979-9B9E-8581EAB2C605}" type="datetimeFigureOut">
               <a:rPr lang="en-US" smtClean="0"/>
-              <a:t>12/2/2015</a:t>
+              <a:t>12/5/2015</a:t>
             </a:fld>
             <a:endParaRPr lang="en-US"/>
           </a:p>
@@ -597,7 +598,7 @@
           <a:p>
             <a:fld id="{923BD7BB-EA44-4979-9B9E-8581EAB2C605}" type="datetimeFigureOut">
               <a:rPr lang="en-US" smtClean="0"/>
-              <a:t>12/2/2015</a:t>
+              <a:t>12/5/2015</a:t>
             </a:fld>
             <a:endParaRPr lang="en-US"/>
           </a:p>
@@ -767,7 +768,7 @@
           <a:p>
             <a:fld id="{923BD7BB-EA44-4979-9B9E-8581EAB2C605}" type="datetimeFigureOut">
               <a:rPr lang="en-US" smtClean="0"/>
-              <a:t>12/2/2015</a:t>
+              <a:t>12/5/2015</a:t>
             </a:fld>
             <a:endParaRPr lang="en-US"/>
           </a:p>
@@ -1013,7 +1014,7 @@
           <a:p>
             <a:fld id="{923BD7BB-EA44-4979-9B9E-8581EAB2C605}" type="datetimeFigureOut">
               <a:rPr lang="en-US" smtClean="0"/>
-              <a:t>12/2/2015</a:t>
+              <a:t>12/5/2015</a:t>
             </a:fld>
             <a:endParaRPr lang="en-US"/>
           </a:p>
@@ -1245,7 +1246,7 @@
           <a:p>
             <a:fld id="{923BD7BB-EA44-4979-9B9E-8581EAB2C605}" type="datetimeFigureOut">
               <a:rPr lang="en-US" smtClean="0"/>
-              <a:t>12/2/2015</a:t>
+              <a:t>12/5/2015</a:t>
             </a:fld>
             <a:endParaRPr lang="en-US"/>
           </a:p>
@@ -1612,7 +1613,7 @@
           <a:p>
             <a:fld id="{923BD7BB-EA44-4979-9B9E-8581EAB2C605}" type="datetimeFigureOut">
               <a:rPr lang="en-US" smtClean="0"/>
-              <a:t>12/2/2015</a:t>
+              <a:t>12/5/2015</a:t>
             </a:fld>
             <a:endParaRPr lang="en-US"/>
           </a:p>
@@ -1730,7 +1731,7 @@
           <a:p>
             <a:fld id="{923BD7BB-EA44-4979-9B9E-8581EAB2C605}" type="datetimeFigureOut">
               <a:rPr lang="en-US" smtClean="0"/>
-              <a:t>12/2/2015</a:t>
+              <a:t>12/5/2015</a:t>
             </a:fld>
             <a:endParaRPr lang="en-US"/>
           </a:p>
@@ -1825,7 +1826,7 @@
           <a:p>
             <a:fld id="{923BD7BB-EA44-4979-9B9E-8581EAB2C605}" type="datetimeFigureOut">
               <a:rPr lang="en-US" smtClean="0"/>
-              <a:t>12/2/2015</a:t>
+              <a:t>12/5/2015</a:t>
             </a:fld>
             <a:endParaRPr lang="en-US"/>
           </a:p>
@@ -2102,7 +2103,7 @@
           <a:p>
             <a:fld id="{923BD7BB-EA44-4979-9B9E-8581EAB2C605}" type="datetimeFigureOut">
               <a:rPr lang="en-US" smtClean="0"/>
-              <a:t>12/2/2015</a:t>
+              <a:t>12/5/2015</a:t>
             </a:fld>
             <a:endParaRPr lang="en-US"/>
           </a:p>
@@ -2355,7 +2356,7 @@
           <a:p>
             <a:fld id="{923BD7BB-EA44-4979-9B9E-8581EAB2C605}" type="datetimeFigureOut">
               <a:rPr lang="en-US" smtClean="0"/>
-              <a:t>12/2/2015</a:t>
+              <a:t>12/5/2015</a:t>
             </a:fld>
             <a:endParaRPr lang="en-US"/>
           </a:p>
@@ -2568,7 +2569,7 @@
           <a:p>
             <a:fld id="{923BD7BB-EA44-4979-9B9E-8581EAB2C605}" type="datetimeFigureOut">
               <a:rPr lang="en-US" smtClean="0"/>
-              <a:t>12/2/2015</a:t>
+              <a:t>12/5/2015</a:t>
             </a:fld>
             <a:endParaRPr lang="en-US"/>
           </a:p>
@@ -3101,19 +3102,105 @@
             <p:ph idx="1"/>
           </p:nvPr>
         </p:nvSpPr>
-        <p:spPr/>
-        <p:txBody>
-          <a:bodyPr/>
-          <a:lstStyle/>
-          <a:p>
-            <a:r>
-              <a:rPr lang="en-US" dirty="0" smtClean="0"/>
-              <a:t>TBD</a:t>
-            </a:r>
+        <p:spPr>
+          <a:xfrm>
+            <a:off x="838200" y="1534886"/>
+            <a:ext cx="10515600" cy="4642077"/>
+          </a:xfrm>
+        </p:spPr>
+        <p:txBody>
+          <a:bodyPr/>
+          <a:lstStyle/>
+          <a:p>
+            <a:r>
+              <a:rPr lang="en-US" sz="1400" dirty="0"/>
+              <a:t>Final Project URL: </a:t>
+            </a:r>
+            <a:r>
+              <a:rPr lang="en-US" sz="1400" dirty="0">
+                <a:hlinkClick r:id="rId2"/>
+              </a:rPr>
+              <a:t>https://public.tableau.com/profile/publish/DATAVIZ100-FINALPROJECT/DATAVIZ100-FinalProject#!/</a:t>
+            </a:r>
+            <a:r>
+              <a:rPr lang="en-US" sz="1400" dirty="0" smtClean="0">
+                <a:hlinkClick r:id="rId2"/>
+              </a:rPr>
+              <a:t>publish-confirm</a:t>
+            </a:r>
+            <a:r>
+              <a:rPr lang="en-US" sz="1400" dirty="0" smtClean="0"/>
+              <a:t> </a:t>
+            </a:r>
+          </a:p>
+          <a:p>
+            <a:pPr marL="0" indent="0">
+              <a:buNone/>
+            </a:pPr>
             <a:endParaRPr lang="en-US" dirty="0"/>
           </a:p>
         </p:txBody>
       </p:sp>
+      <p:pic>
+        <p:nvPicPr>
+          <p:cNvPr id="1027" name="Picture 3"/>
+          <p:cNvPicPr>
+            <a:picLocks noChangeAspect="1" noChangeArrowheads="1"/>
+          </p:cNvPicPr>
+          <p:nvPr/>
+        </p:nvPicPr>
+        <p:blipFill>
+          <a:blip r:embed="rId3">
+            <a:extLst>
+              <a:ext uri="{28A0092B-C50C-407E-A947-70E740481C1C}">
+                <a14:useLocalDpi xmlns:a14="http://schemas.microsoft.com/office/drawing/2010/main" val="0"/>
+              </a:ext>
+            </a:extLst>
+          </a:blip>
+          <a:srcRect/>
+          <a:stretch>
+            <a:fillRect/>
+          </a:stretch>
+        </p:blipFill>
+        <p:spPr bwMode="auto">
+          <a:xfrm>
+            <a:off x="3143250" y="1991206"/>
+            <a:ext cx="5612267" cy="4483072"/>
+          </a:xfrm>
+          <a:prstGeom prst="rect">
+            <a:avLst/>
+          </a:prstGeom>
+          <a:ln>
+            <a:noFill/>
+          </a:ln>
+          <a:effectLst>
+            <a:outerShdw blurRad="292100" dist="139700" dir="2700000" algn="tl" rotWithShape="0">
+              <a:srgbClr val="333333">
+                <a:alpha val="65000"/>
+              </a:srgbClr>
+            </a:outerShdw>
+          </a:effectLst>
+          <a:extLst>
+            <a:ext uri="{909E8E84-426E-40DD-AFC4-6F175D3DCCD1}">
+              <a14:hiddenFill xmlns:a14="http://schemas.microsoft.com/office/drawing/2010/main">
+                <a:solidFill>
+                  <a:schemeClr val="accent1"/>
+                </a:solidFill>
+              </a14:hiddenFill>
+            </a:ext>
+            <a:ext uri="{91240B29-F687-4F45-9708-019B960494DF}">
+              <a14:hiddenLine xmlns:a14="http://schemas.microsoft.com/office/drawing/2010/main" w="9525">
+                <a:solidFill>
+                  <a:schemeClr val="tx1"/>
+                </a:solidFill>
+                <a:miter lim="800000"/>
+                <a:headEnd/>
+                <a:tailEnd/>
+              </a14:hiddenLine>
+            </a:ext>
+          </a:extLst>
+        </p:spPr>
+      </p:pic>
     </p:spTree>
     <p:extLst>
       <p:ext uri="{BB962C8B-B14F-4D97-AF65-F5344CB8AC3E}">
@@ -3161,7 +3248,7 @@
           <a:p>
             <a:r>
               <a:rPr lang="en-US" dirty="0" smtClean="0"/>
-              <a:t>City of Redmond - Issued Permits Database</a:t>
+              <a:t>Explanations</a:t>
             </a:r>
             <a:endParaRPr lang="en-US" dirty="0"/>
           </a:p>
@@ -3179,50 +3266,60 @@
         </p:nvSpPr>
         <p:spPr/>
         <p:txBody>
-          <a:bodyPr/>
+          <a:bodyPr>
+            <a:normAutofit fontScale="92500" lnSpcReduction="20000"/>
+          </a:bodyPr>
           <a:lstStyle/>
           <a:p>
             <a:r>
               <a:rPr lang="en-US" dirty="0" smtClean="0"/>
-              <a:t>URL of the data: </a:t>
-            </a:r>
-            <a:r>
-              <a:rPr lang="en-US" dirty="0" smtClean="0">
-                <a:hlinkClick r:id="rId2"/>
+              <a:t>The vis is designed to present number of issued permits in Redmond, WA, </a:t>
+            </a:r>
+            <a:r>
+              <a:rPr lang="en-US" dirty="0" smtClean="0"/>
+              <a:t>USA</a:t>
+            </a:r>
+          </a:p>
+          <a:p>
+            <a:r>
+              <a:rPr lang="en-US" b="1" dirty="0" smtClean="0">
+                <a:solidFill>
+                  <a:srgbClr val="FF0000"/>
+                </a:solidFill>
               </a:rPr>
-              <a:t>https://data.redmond.gov/dataset/Issued-Permits/wzgk-dadm</a:t>
+              <a:t>Permit Type </a:t>
+            </a:r>
+            <a:r>
+              <a:rPr lang="en-US" dirty="0" smtClean="0"/>
+              <a:t>dropdown is the main driver for the viz.  The visualization elements are synchronized to reflect changes is selected data. Map does not work well if individual values (per month) are selected in the timeline.</a:t>
             </a:r>
             <a:endParaRPr lang="en-US" dirty="0" smtClean="0"/>
           </a:p>
           <a:p>
             <a:r>
               <a:rPr lang="en-US" dirty="0" smtClean="0"/>
-              <a:t>Method: Exploratory</a:t>
+              <a:t>The time frame of the dataset stretches from 2010 through 2015, however, the real data is present from mid 2012 onward</a:t>
             </a:r>
           </a:p>
           <a:p>
             <a:r>
               <a:rPr lang="en-US" dirty="0" smtClean="0"/>
-              <a:t>Data Retrieved 12/01/2015</a:t>
+              <a:t>I have included a parameter with three options, a graphic, URL’s, two chart types (one of them is MAP), and a data table.</a:t>
             </a:r>
           </a:p>
           <a:p>
             <a:r>
               <a:rPr lang="en-US" dirty="0" smtClean="0"/>
-              <a:t>Data is modified to separate Latitude and Longitude from the Address field in the dataset</a:t>
+              <a:t>I am totally lacking any artistic talent, so my visualization may seam plain, but I really tried.</a:t>
             </a:r>
           </a:p>
           <a:p>
             <a:r>
               <a:rPr lang="en-US" dirty="0" smtClean="0"/>
-              <a:t>Incomplete records (null values for longitude and latitude) are removed</a:t>
-            </a:r>
-          </a:p>
-          <a:p>
-            <a:r>
-              <a:rPr lang="en-US" dirty="0" smtClean="0"/>
-              <a:t>Valuation and Total Fees fields changed to be type of Currency</a:t>
-            </a:r>
+              <a:t>P.S. You make it look really easy, however, in reality, working with Tableau is quite hard.</a:t>
+            </a:r>
+          </a:p>
+          <a:p>
             <a:endParaRPr lang="en-US" dirty="0"/>
           </a:p>
         </p:txBody>
@@ -3230,7 +3327,7 @@
     </p:spTree>
     <p:extLst>
       <p:ext uri="{BB962C8B-B14F-4D97-AF65-F5344CB8AC3E}">
-        <p14:creationId xmlns:p14="http://schemas.microsoft.com/office/powerpoint/2010/main" val="864498563"/>
+        <p14:creationId xmlns:p14="http://schemas.microsoft.com/office/powerpoint/2010/main" val="4099196794"/>
       </p:ext>
     </p:extLst>
   </p:cSld>
@@ -3274,6 +3371,119 @@
           <a:p>
             <a:r>
               <a:rPr lang="en-US" dirty="0" smtClean="0"/>
+              <a:t>City of Redmond - Issued Permits Database</a:t>
+            </a:r>
+            <a:endParaRPr lang="en-US" dirty="0"/>
+          </a:p>
+        </p:txBody>
+      </p:sp>
+      <p:sp>
+        <p:nvSpPr>
+          <p:cNvPr id="3" name="Content Placeholder 2"/>
+          <p:cNvSpPr>
+            <a:spLocks noGrp="1"/>
+          </p:cNvSpPr>
+          <p:nvPr>
+            <p:ph idx="1"/>
+          </p:nvPr>
+        </p:nvSpPr>
+        <p:spPr/>
+        <p:txBody>
+          <a:bodyPr/>
+          <a:lstStyle/>
+          <a:p>
+            <a:r>
+              <a:rPr lang="en-US" dirty="0" smtClean="0"/>
+              <a:t>URL of the data: </a:t>
+            </a:r>
+            <a:r>
+              <a:rPr lang="en-US" dirty="0" smtClean="0">
+                <a:hlinkClick r:id="rId2"/>
+              </a:rPr>
+              <a:t>https://data.redmond.gov/dataset/Issued-Permits/wzgk-dadm</a:t>
+            </a:r>
+            <a:endParaRPr lang="en-US" dirty="0" smtClean="0"/>
+          </a:p>
+          <a:p>
+            <a:r>
+              <a:rPr lang="en-US" dirty="0" smtClean="0"/>
+              <a:t>Method: Exploratory</a:t>
+            </a:r>
+          </a:p>
+          <a:p>
+            <a:r>
+              <a:rPr lang="en-US" dirty="0" smtClean="0"/>
+              <a:t>Data Retrieved 12/01/2015</a:t>
+            </a:r>
+          </a:p>
+          <a:p>
+            <a:r>
+              <a:rPr lang="en-US" dirty="0" smtClean="0"/>
+              <a:t>Data is modified to separate Latitude and Longitude from the Address field in the dataset</a:t>
+            </a:r>
+          </a:p>
+          <a:p>
+            <a:r>
+              <a:rPr lang="en-US" dirty="0" smtClean="0"/>
+              <a:t>Incomplete records (null values for longitude and latitude) are removed</a:t>
+            </a:r>
+          </a:p>
+          <a:p>
+            <a:r>
+              <a:rPr lang="en-US" dirty="0" smtClean="0"/>
+              <a:t>Valuation and Total Fees fields changed to be type of Currency</a:t>
+            </a:r>
+            <a:endParaRPr lang="en-US" dirty="0"/>
+          </a:p>
+        </p:txBody>
+      </p:sp>
+    </p:spTree>
+    <p:extLst>
+      <p:ext uri="{BB962C8B-B14F-4D97-AF65-F5344CB8AC3E}">
+        <p14:creationId xmlns:p14="http://schemas.microsoft.com/office/powerpoint/2010/main" val="864498563"/>
+      </p:ext>
+    </p:extLst>
+  </p:cSld>
+  <p:clrMapOvr>
+    <a:masterClrMapping/>
+  </p:clrMapOvr>
+</p:sld>
+</file>
+
+<file path=ppt/slides/slide5.xml><?xml version="1.0" encoding="utf-8"?>
+<p:sld xmlns:a="http://schemas.openxmlformats.org/drawingml/2006/main" xmlns:r="http://schemas.openxmlformats.org/officeDocument/2006/relationships" xmlns:p="http://schemas.openxmlformats.org/presentationml/2006/main">
+  <p:cSld>
+    <p:spTree>
+      <p:nvGrpSpPr>
+        <p:cNvPr id="1" name=""/>
+        <p:cNvGrpSpPr/>
+        <p:nvPr/>
+      </p:nvGrpSpPr>
+      <p:grpSpPr>
+        <a:xfrm>
+          <a:off x="0" y="0"/>
+          <a:ext cx="0" cy="0"/>
+          <a:chOff x="0" y="0"/>
+          <a:chExt cx="0" cy="0"/>
+        </a:xfrm>
+      </p:grpSpPr>
+      <p:sp>
+        <p:nvSpPr>
+          <p:cNvPr id="2" name="Title 1"/>
+          <p:cNvSpPr>
+            <a:spLocks noGrp="1"/>
+          </p:cNvSpPr>
+          <p:nvPr>
+            <p:ph type="title"/>
+          </p:nvPr>
+        </p:nvSpPr>
+        <p:spPr/>
+        <p:txBody>
+          <a:bodyPr/>
+          <a:lstStyle/>
+          <a:p>
+            <a:r>
+              <a:rPr lang="en-US" dirty="0" smtClean="0"/>
               <a:t>The story (Planned)</a:t>
             </a:r>
             <a:endParaRPr lang="en-US" dirty="0"/>
@@ -3347,7 +3557,7 @@
 </p:sld>
 </file>
 
-<file path=ppt/slides/slide5.xml><?xml version="1.0" encoding="utf-8"?>
+<file path=ppt/slides/slide6.xml><?xml version="1.0" encoding="utf-8"?>
 <p:sld xmlns:a="http://schemas.openxmlformats.org/drawingml/2006/main" xmlns:r="http://schemas.openxmlformats.org/officeDocument/2006/relationships" xmlns:p="http://schemas.openxmlformats.org/presentationml/2006/main">
   <p:cSld>
     <p:spTree>
@@ -3763,7 +3973,7 @@
   <a:extraClrSchemeLst/>
   <a:extLst>
     <a:ext uri="{05A4C25C-085E-4340-85A3-A5531E510DB2}">
-      <thm15:themeFamily xmlns:thm15="http://schemas.microsoft.com/office/thememl/2012/main" name="Office Theme" id="{62F939B6-93AF-4DB8-9C6B-D6C7DFDC589F}" vid="{4A3C46E8-61CC-4603-A589-7422A47A8E4A}"/>
+      <thm15:themeFamily xmlns="" xmlns:thm15="http://schemas.microsoft.com/office/thememl/2012/main" name="Office Theme" id="{62F939B6-93AF-4DB8-9C6B-D6C7DFDC589F}" vid="{4A3C46E8-61CC-4603-A589-7422A47A8E4A}"/>
     </a:ext>
   </a:extLst>
 </a:theme>

</xml_diff>